<commit_message>
switched to ff linearization
</commit_message>
<xml_diff>
--- a/Zwischenpräsentation Gewerk 3 2023-03-14.pptx
+++ b/Zwischenpräsentation Gewerk 3 2023-03-14.pptx
@@ -209,7 +209,7 @@
           <a:p>
             <a:fld id="{2DA48A74-60F3-4CCB-B000-49CB13AC6111}" type="datetimeFigureOut">
               <a:rPr lang="de-DE" smtClean="0"/>
-              <a:t>14.03.2023</a:t>
+              <a:t>16.03.2023</a:t>
             </a:fld>
             <a:endParaRPr lang="de-DE"/>
           </a:p>
@@ -4973,7 +4973,7 @@
           <p:nvPr>
             <p:extLst>
               <p:ext uri="{D42A27DB-BD31-4B8C-83A1-F6EECF244321}">
-                <p14:modId xmlns:p14="http://schemas.microsoft.com/office/powerpoint/2010/main" val="3331678473"/>
+                <p14:modId xmlns:p14="http://schemas.microsoft.com/office/powerpoint/2010/main" val="4196458791"/>
               </p:ext>
             </p:extLst>
           </p:nvPr>
@@ -5184,7 +5184,7 @@
                       </a:pPr>
                       <a:r>
                         <a:rPr lang="de-DE" dirty="0"/>
-                        <a:t>…</a:t>
+                        <a:t>Ggf. Trajektorie</a:t>
                       </a:r>
                     </a:p>
                   </a:txBody>
@@ -8547,6 +8547,12 @@
 </file>
 
 <file path=customXml/item2.xml><?xml version="1.0" encoding="utf-8"?>
+<p:properties xmlns:p="http://schemas.microsoft.com/office/2006/metadata/properties" xmlns:xsi="http://www.w3.org/2001/XMLSchema-instance" xmlns:pc="http://schemas.microsoft.com/office/infopath/2007/PartnerControls">
+  <documentManagement/>
+</p:properties>
+</file>
+
+<file path=customXml/item3.xml><?xml version="1.0" encoding="utf-8"?>
 <ct:contentTypeSchema xmlns:ct="http://schemas.microsoft.com/office/2006/metadata/contentType" xmlns:ma="http://schemas.microsoft.com/office/2006/metadata/properties/metaAttributes" ct:_="" ma:_="" ma:contentTypeName="Dokument" ma:contentTypeID="0x010100CD54F1DF9B3DAC418FF0E8CBE5333DC2" ma:contentTypeVersion="0" ma:contentTypeDescription="Ein neues Dokument erstellen." ma:contentTypeScope="" ma:versionID="88d004149d61f72da76f1449a4071ddf">
   <xsd:schema xmlns:xsd="http://www.w3.org/2001/XMLSchema" xmlns:xs="http://www.w3.org/2001/XMLSchema" xmlns:p="http://schemas.microsoft.com/office/2006/metadata/properties" targetNamespace="http://schemas.microsoft.com/office/2006/metadata/properties" ma:root="true" ma:fieldsID="7bbc8f02f141debb78922eb02f6cf049">
     <xsd:element name="properties">
@@ -8660,12 +8666,6 @@
 </ct:contentTypeSchema>
 </file>
 
-<file path=customXml/item3.xml><?xml version="1.0" encoding="utf-8"?>
-<p:properties xmlns:p="http://schemas.microsoft.com/office/2006/metadata/properties" xmlns:xsi="http://www.w3.org/2001/XMLSchema-instance" xmlns:pc="http://schemas.microsoft.com/office/infopath/2007/PartnerControls">
-  <documentManagement/>
-</p:properties>
-</file>
-
 <file path=customXml/itemProps1.xml><?xml version="1.0" encoding="utf-8"?>
 <ds:datastoreItem xmlns:ds="http://schemas.openxmlformats.org/officeDocument/2006/customXml" ds:itemID="{8A0B21F3-841E-4555-A4D3-5F2B56FA271D}">
   <ds:schemaRefs>
@@ -8675,6 +8675,21 @@
 </file>
 
 <file path=customXml/itemProps2.xml><?xml version="1.0" encoding="utf-8"?>
+<ds:datastoreItem xmlns:ds="http://schemas.openxmlformats.org/officeDocument/2006/customXml" ds:itemID="{7AAEB563-AA36-47D4-86A5-8FECDB4AC788}">
+  <ds:schemaRefs>
+    <ds:schemaRef ds:uri="http://schemas.microsoft.com/office/infopath/2007/PartnerControls"/>
+    <ds:schemaRef ds:uri="http://schemas.microsoft.com/office/2006/documentManagement/types"/>
+    <ds:schemaRef ds:uri="http://schemas.microsoft.com/office/2006/metadata/properties"/>
+    <ds:schemaRef ds:uri="http://purl.org/dc/terms/"/>
+    <ds:schemaRef ds:uri="http://schemas.openxmlformats.org/package/2006/metadata/core-properties"/>
+    <ds:schemaRef ds:uri="http://www.w3.org/XML/1998/namespace"/>
+    <ds:schemaRef ds:uri="http://purl.org/dc/dcmitype/"/>
+    <ds:schemaRef ds:uri="http://purl.org/dc/elements/1.1/"/>
+  </ds:schemaRefs>
+</ds:datastoreItem>
+</file>
+
+<file path=customXml/itemProps3.xml><?xml version="1.0" encoding="utf-8"?>
 <ds:datastoreItem xmlns:ds="http://schemas.openxmlformats.org/officeDocument/2006/customXml" ds:itemID="{6E7EDE59-BAAB-4B45-A49F-8D1D17B7EACF}">
   <ds:schemaRefs>
     <ds:schemaRef ds:uri="http://schemas.microsoft.com/office/2006/metadata/contentType"/>
@@ -8688,19 +8703,4 @@
     <ds:schemaRef ds:uri="http://schemas.microsoft.com/office/infopath/2007/PartnerControls"/>
   </ds:schemaRefs>
 </ds:datastoreItem>
-</file>
-
-<file path=customXml/itemProps3.xml><?xml version="1.0" encoding="utf-8"?>
-<ds:datastoreItem xmlns:ds="http://schemas.openxmlformats.org/officeDocument/2006/customXml" ds:itemID="{7AAEB563-AA36-47D4-86A5-8FECDB4AC788}">
-  <ds:schemaRefs>
-    <ds:schemaRef ds:uri="http://schemas.microsoft.com/office/infopath/2007/PartnerControls"/>
-    <ds:schemaRef ds:uri="http://schemas.microsoft.com/office/2006/documentManagement/types"/>
-    <ds:schemaRef ds:uri="http://schemas.microsoft.com/office/2006/metadata/properties"/>
-    <ds:schemaRef ds:uri="http://purl.org/dc/terms/"/>
-    <ds:schemaRef ds:uri="http://schemas.openxmlformats.org/package/2006/metadata/core-properties"/>
-    <ds:schemaRef ds:uri="http://www.w3.org/XML/1998/namespace"/>
-    <ds:schemaRef ds:uri="http://purl.org/dc/dcmitype/"/>
-    <ds:schemaRef ds:uri="http://purl.org/dc/elements/1.1/"/>
-  </ds:schemaRefs>
-</ds:datastoreItem>
 </file>
</xml_diff>